<commit_message>
anp, sales 매뉴얼 추가
</commit_message>
<xml_diff>
--- a/image2.pptx
+++ b/image2.pptx
@@ -282,7 +282,7 @@
           <a:p>
             <a:fld id="{BCB002D4-23EE-4E87-B595-31C4A3955AD9}" type="datetimeFigureOut">
               <a:rPr lang="ko-KR" altLang="en-US" smtClean="0"/>
-              <a:t>2019. 3. 16.</a:t>
+              <a:t>2019. 9. 3.</a:t>
             </a:fld>
             <a:endParaRPr lang="ko-KR" altLang="en-US"/>
           </a:p>
@@ -452,7 +452,7 @@
           <a:p>
             <a:fld id="{BCB002D4-23EE-4E87-B595-31C4A3955AD9}" type="datetimeFigureOut">
               <a:rPr lang="ko-KR" altLang="en-US" smtClean="0"/>
-              <a:t>2019. 3. 16.</a:t>
+              <a:t>2019. 9. 3.</a:t>
             </a:fld>
             <a:endParaRPr lang="ko-KR" altLang="en-US"/>
           </a:p>
@@ -632,7 +632,7 @@
           <a:p>
             <a:fld id="{BCB002D4-23EE-4E87-B595-31C4A3955AD9}" type="datetimeFigureOut">
               <a:rPr lang="ko-KR" altLang="en-US" smtClean="0"/>
-              <a:t>2019. 3. 16.</a:t>
+              <a:t>2019. 9. 3.</a:t>
             </a:fld>
             <a:endParaRPr lang="ko-KR" altLang="en-US"/>
           </a:p>
@@ -802,7 +802,7 @@
           <a:p>
             <a:fld id="{BCB002D4-23EE-4E87-B595-31C4A3955AD9}" type="datetimeFigureOut">
               <a:rPr lang="ko-KR" altLang="en-US" smtClean="0"/>
-              <a:t>2019. 3. 16.</a:t>
+              <a:t>2019. 9. 3.</a:t>
             </a:fld>
             <a:endParaRPr lang="ko-KR" altLang="en-US"/>
           </a:p>
@@ -1048,7 +1048,7 @@
           <a:p>
             <a:fld id="{BCB002D4-23EE-4E87-B595-31C4A3955AD9}" type="datetimeFigureOut">
               <a:rPr lang="ko-KR" altLang="en-US" smtClean="0"/>
-              <a:t>2019. 3. 16.</a:t>
+              <a:t>2019. 9. 3.</a:t>
             </a:fld>
             <a:endParaRPr lang="ko-KR" altLang="en-US"/>
           </a:p>
@@ -1280,7 +1280,7 @@
           <a:p>
             <a:fld id="{BCB002D4-23EE-4E87-B595-31C4A3955AD9}" type="datetimeFigureOut">
               <a:rPr lang="ko-KR" altLang="en-US" smtClean="0"/>
-              <a:t>2019. 3. 16.</a:t>
+              <a:t>2019. 9. 3.</a:t>
             </a:fld>
             <a:endParaRPr lang="ko-KR" altLang="en-US"/>
           </a:p>
@@ -1647,7 +1647,7 @@
           <a:p>
             <a:fld id="{BCB002D4-23EE-4E87-B595-31C4A3955AD9}" type="datetimeFigureOut">
               <a:rPr lang="ko-KR" altLang="en-US" smtClean="0"/>
-              <a:t>2019. 3. 16.</a:t>
+              <a:t>2019. 9. 3.</a:t>
             </a:fld>
             <a:endParaRPr lang="ko-KR" altLang="en-US"/>
           </a:p>
@@ -1765,7 +1765,7 @@
           <a:p>
             <a:fld id="{BCB002D4-23EE-4E87-B595-31C4A3955AD9}" type="datetimeFigureOut">
               <a:rPr lang="ko-KR" altLang="en-US" smtClean="0"/>
-              <a:t>2019. 3. 16.</a:t>
+              <a:t>2019. 9. 3.</a:t>
             </a:fld>
             <a:endParaRPr lang="ko-KR" altLang="en-US"/>
           </a:p>
@@ -1860,7 +1860,7 @@
           <a:p>
             <a:fld id="{BCB002D4-23EE-4E87-B595-31C4A3955AD9}" type="datetimeFigureOut">
               <a:rPr lang="ko-KR" altLang="en-US" smtClean="0"/>
-              <a:t>2019. 3. 16.</a:t>
+              <a:t>2019. 9. 3.</a:t>
             </a:fld>
             <a:endParaRPr lang="ko-KR" altLang="en-US"/>
           </a:p>
@@ -2137,7 +2137,7 @@
           <a:p>
             <a:fld id="{BCB002D4-23EE-4E87-B595-31C4A3955AD9}" type="datetimeFigureOut">
               <a:rPr lang="ko-KR" altLang="en-US" smtClean="0"/>
-              <a:t>2019. 3. 16.</a:t>
+              <a:t>2019. 9. 3.</a:t>
             </a:fld>
             <a:endParaRPr lang="ko-KR" altLang="en-US"/>
           </a:p>
@@ -2390,7 +2390,7 @@
           <a:p>
             <a:fld id="{BCB002D4-23EE-4E87-B595-31C4A3955AD9}" type="datetimeFigureOut">
               <a:rPr lang="ko-KR" altLang="en-US" smtClean="0"/>
-              <a:t>2019. 3. 16.</a:t>
+              <a:t>2019. 9. 3.</a:t>
             </a:fld>
             <a:endParaRPr lang="ko-KR" altLang="en-US"/>
           </a:p>
@@ -2603,7 +2603,7 @@
           <a:p>
             <a:fld id="{BCB002D4-23EE-4E87-B595-31C4A3955AD9}" type="datetimeFigureOut">
               <a:rPr lang="ko-KR" altLang="en-US" smtClean="0"/>
-              <a:t>2019. 3. 16.</a:t>
+              <a:t>2019. 9. 3.</a:t>
             </a:fld>
             <a:endParaRPr lang="ko-KR" altLang="en-US"/>
           </a:p>
@@ -4391,6 +4391,30 @@
           </a:p>
         </p:txBody>
       </p:sp>
+      <p:pic>
+        <p:nvPicPr>
+          <p:cNvPr id="5" name="그림 4"/>
+          <p:cNvPicPr>
+            <a:picLocks noChangeAspect="1"/>
+          </p:cNvPicPr>
+          <p:nvPr/>
+        </p:nvPicPr>
+        <p:blipFill>
+          <a:blip r:embed="rId4"/>
+          <a:stretch>
+            <a:fillRect/>
+          </a:stretch>
+        </p:blipFill>
+        <p:spPr>
+          <a:xfrm>
+            <a:off x="1031630" y="3338985"/>
+            <a:ext cx="7765366" cy="3298018"/>
+          </a:xfrm>
+          <a:prstGeom prst="rect">
+            <a:avLst/>
+          </a:prstGeom>
+        </p:spPr>
+      </p:pic>
     </p:spTree>
     <p:extLst>
       <p:ext uri="{BB962C8B-B14F-4D97-AF65-F5344CB8AC3E}">
@@ -9118,11 +9142,6 @@
               </a:rPr>
               <a:t>①②②③④⑤⑥⑦⑧⑨⑩</a:t>
             </a:r>
-            <a:endParaRPr lang="ko-KR" altLang="en-US" sz="1600" dirty="0">
-              <a:solidFill>
-                <a:srgbClr val="C00000"/>
-              </a:solidFill>
-            </a:endParaRPr>
           </a:p>
         </p:txBody>
       </p:sp>
@@ -9671,11 +9690,6 @@
               </a:rPr>
               <a:t>①②②③④⑤⑥⑦⑧⑨⑩</a:t>
             </a:r>
-            <a:endParaRPr lang="ko-KR" altLang="en-US" sz="1600" dirty="0">
-              <a:solidFill>
-                <a:srgbClr val="C00000"/>
-              </a:solidFill>
-            </a:endParaRPr>
           </a:p>
         </p:txBody>
       </p:sp>

</xml_diff>